<commit_message>
fixed typos in L4.2
</commit_message>
<xml_diff>
--- a/Slides/Lesson 4.2 Using the List Template.pptx
+++ b/Slides/Lesson 4.2 Using the List Template.pptx
@@ -240,7 +240,7 @@
             <a:fld id="{CF8F25F6-E1EF-4065-8525-42EDEBD9BD22}" type="datetimeFigureOut">
               <a:rPr lang="en-US" smtClean="0"/>
               <a:pPr/>
-              <a:t>8/25/2015</a:t>
+              <a:t>10/3/2015</a:t>
             </a:fld>
             <a:endParaRPr lang="en-US"/>
           </a:p>
@@ -779,7 +779,7 @@
           <a:p>
             <a:fld id="{2F1F79F5-7BEC-496A-AFC7-876E38F64D71}" type="datetime1">
               <a:rPr lang="en-US" smtClean="0"/>
-              <a:t>8/25/2015</a:t>
+              <a:t>10/3/2015</a:t>
             </a:fld>
             <a:endParaRPr lang="en-US"/>
           </a:p>
@@ -881,7 +881,7 @@
           <a:p>
             <a:fld id="{0A05703A-7669-4FEA-9056-25299B4D29D4}" type="datetime1">
               <a:rPr lang="en-US" smtClean="0"/>
-              <a:t>8/25/2015</a:t>
+              <a:t>10/3/2015</a:t>
             </a:fld>
             <a:endParaRPr lang="en-US"/>
           </a:p>
@@ -1158,7 +1158,7 @@
           <a:p>
             <a:fld id="{6E5077B5-BB57-49DB-88CA-226A139E5C01}" type="datetime1">
               <a:rPr lang="en-US" smtClean="0"/>
-              <a:t>8/25/2015</a:t>
+              <a:t>10/3/2015</a:t>
             </a:fld>
             <a:endParaRPr lang="en-US"/>
           </a:p>
@@ -1411,7 +1411,7 @@
           <a:p>
             <a:fld id="{C48D9447-CBD6-49A1-89FD-8512A8CF8999}" type="datetime1">
               <a:rPr lang="en-US" smtClean="0"/>
-              <a:t>8/25/2015</a:t>
+              <a:t>10/3/2015</a:t>
             </a:fld>
             <a:endParaRPr lang="en-US"/>
           </a:p>
@@ -1581,7 +1581,7 @@
           <a:p>
             <a:fld id="{A3639A2A-823D-48B7-9ACE-7FAF42870BA9}" type="datetime1">
               <a:rPr lang="en-US" smtClean="0"/>
-              <a:t>8/25/2015</a:t>
+              <a:t>10/3/2015</a:t>
             </a:fld>
             <a:endParaRPr lang="en-US"/>
           </a:p>
@@ -1761,7 +1761,7 @@
           <a:p>
             <a:fld id="{ED1B6996-82E9-463C-972C-7B56056E426C}" type="datetime1">
               <a:rPr lang="en-US" smtClean="0"/>
-              <a:t>8/25/2015</a:t>
+              <a:t>10/3/2015</a:t>
             </a:fld>
             <a:endParaRPr lang="en-US"/>
           </a:p>
@@ -1937,7 +1937,7 @@
           <a:p>
             <a:fld id="{E22ED4DA-448D-4BB1-B935-CC112220207B}" type="datetime1">
               <a:rPr lang="en-US" smtClean="0"/>
-              <a:t>8/25/2015</a:t>
+              <a:t>10/3/2015</a:t>
             </a:fld>
             <a:endParaRPr lang="en-US"/>
           </a:p>
@@ -2119,7 +2119,7 @@
           <a:p>
             <a:fld id="{E22ED4DA-448D-4BB1-B935-CC112220207B}" type="datetime1">
               <a:rPr lang="en-US" smtClean="0"/>
-              <a:t>8/25/2015</a:t>
+              <a:t>10/3/2015</a:t>
             </a:fld>
             <a:endParaRPr lang="en-US"/>
           </a:p>
@@ -2388,7 +2388,7 @@
           <a:p>
             <a:fld id="{FF5D65A6-AB94-4435-B0B7-3743215FA46C}" type="datetime1">
               <a:rPr lang="en-US" smtClean="0"/>
-              <a:t>8/25/2015</a:t>
+              <a:t>10/3/2015</a:t>
             </a:fld>
             <a:endParaRPr lang="en-US"/>
           </a:p>
@@ -2573,7 +2573,7 @@
           <a:p>
             <a:fld id="{FF5D65A6-AB94-4435-B0B7-3743215FA46C}" type="datetime1">
               <a:rPr lang="en-US" smtClean="0"/>
-              <a:t>8/25/2015</a:t>
+              <a:t>10/3/2015</a:t>
             </a:fld>
             <a:endParaRPr lang="en-US"/>
           </a:p>
@@ -2875,7 +2875,7 @@
           <a:p>
             <a:fld id="{7C193DC4-6EF0-48C9-B29C-616106A645E1}" type="datetime1">
               <a:rPr lang="en-US" smtClean="0"/>
-              <a:t>8/25/2015</a:t>
+              <a:t>10/3/2015</a:t>
             </a:fld>
             <a:endParaRPr lang="en-US"/>
           </a:p>
@@ -3163,7 +3163,7 @@
           <a:p>
             <a:fld id="{5D1846AD-9252-4647-9435-4C2AC365653A}" type="datetime1">
               <a:rPr lang="en-US" smtClean="0"/>
-              <a:t>8/25/2015</a:t>
+              <a:t>10/3/2015</a:t>
             </a:fld>
             <a:endParaRPr lang="en-US"/>
           </a:p>
@@ -3585,7 +3585,7 @@
           <a:p>
             <a:fld id="{CE56DC10-3561-4063-A6AF-C1CC7A41040A}" type="datetime1">
               <a:rPr lang="en-US" smtClean="0"/>
-              <a:t>8/25/2015</a:t>
+              <a:t>10/3/2015</a:t>
             </a:fld>
             <a:endParaRPr lang="en-US"/>
           </a:p>
@@ -3703,7 +3703,7 @@
           <a:p>
             <a:fld id="{2F7B77F5-1464-4F6B-92A8-64FC8A508293}" type="datetime1">
               <a:rPr lang="en-US" smtClean="0"/>
-              <a:t>8/25/2015</a:t>
+              <a:t>10/3/2015</a:t>
             </a:fld>
             <a:endParaRPr lang="en-US"/>
           </a:p>
@@ -3935,7 +3935,7 @@
           <a:p>
             <a:fld id="{02B3F677-983B-48DB-ADFD-63FE6CBC7FB2}" type="datetime1">
               <a:rPr lang="en-US" smtClean="0"/>
-              <a:t>8/25/2015</a:t>
+              <a:t>10/3/2015</a:t>
             </a:fld>
             <a:endParaRPr lang="en-US"/>
           </a:p>
@@ -10930,11 +10930,15 @@
             <a:pPr lvl="0"/>
             <a:r>
               <a:rPr lang="en-US" dirty="0"/>
-              <a:t>Use the </a:t>
+              <a:t>Use </a:t>
             </a:r>
             <a:r>
               <a:rPr lang="en-US" dirty="0" smtClean="0"/>
-              <a:t>use the template </a:t>
+              <a:t>the </a:t>
+            </a:r>
+            <a:r>
+              <a:rPr lang="en-US" dirty="0" smtClean="0"/>
+              <a:t>template </a:t>
             </a:r>
             <a:r>
               <a:rPr lang="en-US" dirty="0"/>
@@ -14818,119 +14822,84 @@
           </a:p>
         </p:txBody>
       </p:sp>
-      <p:grpSp>
-        <p:nvGrpSpPr>
-          <p:cNvPr id="19" name="Group 18"/>
-          <p:cNvGrpSpPr/>
+      <p:sp>
+        <p:nvSpPr>
+          <p:cNvPr id="4" name="Rectangle 3"/>
+          <p:cNvSpPr/>
           <p:nvPr/>
-        </p:nvGrpSpPr>
-        <p:grpSpPr>
+        </p:nvSpPr>
+        <p:spPr>
           <a:xfrm>
-            <a:off x="609600" y="5486400"/>
-            <a:ext cx="3276600" cy="1295400"/>
-            <a:chOff x="609600" y="5486400"/>
-            <a:chExt cx="3276600" cy="1295400"/>
+            <a:off x="609600" y="6019800"/>
+            <a:ext cx="3276600" cy="762000"/>
           </a:xfrm>
-        </p:grpSpPr>
-        <p:sp>
-          <p:nvSpPr>
-            <p:cNvPr id="4" name="Rectangle 3"/>
-            <p:cNvSpPr/>
-            <p:nvPr/>
-          </p:nvSpPr>
-          <p:spPr>
-            <a:xfrm>
-              <a:off x="609600" y="6019800"/>
-              <a:ext cx="3276600" cy="762000"/>
-            </a:xfrm>
-            <a:prstGeom prst="rect">
+          <a:prstGeom prst="rect">
+            <a:avLst/>
+          </a:prstGeom>
+          <a:solidFill>
+            <a:schemeClr val="accent3">
+              <a:lumMod val="40000"/>
+              <a:lumOff val="60000"/>
+            </a:schemeClr>
+          </a:solidFill>
+          <a:ln/>
+        </p:spPr>
+        <p:style>
+          <a:lnRef idx="2">
+            <a:schemeClr val="accent1"/>
+          </a:lnRef>
+          <a:fillRef idx="1">
+            <a:schemeClr val="lt1"/>
+          </a:fillRef>
+          <a:effectRef idx="0">
+            <a:schemeClr val="accent1"/>
+          </a:effectRef>
+          <a:fontRef idx="minor">
+            <a:schemeClr val="dk1"/>
+          </a:fontRef>
+        </p:style>
+        <p:txBody>
+          <a:bodyPr rot="0" spcFirstLastPara="0" vertOverflow="overflow" horzOverflow="overflow" vert="horz" wrap="square" lIns="91440" tIns="45720" rIns="91440" bIns="45720" numCol="1" spcCol="0" rtlCol="0" fromWordArt="0" anchor="ctr" anchorCtr="0" forceAA="0" compatLnSpc="1">
+            <a:prstTxWarp prst="textNoShape">
               <a:avLst/>
-            </a:prstGeom>
-            <a:solidFill>
-              <a:schemeClr val="accent3">
-                <a:lumMod val="40000"/>
-                <a:lumOff val="60000"/>
-              </a:schemeClr>
-            </a:solidFill>
-            <a:ln/>
-          </p:spPr>
-          <p:style>
-            <a:lnRef idx="2">
-              <a:schemeClr val="accent1"/>
-            </a:lnRef>
-            <a:fillRef idx="1">
-              <a:schemeClr val="lt1"/>
-            </a:fillRef>
-            <a:effectRef idx="0">
-              <a:schemeClr val="accent1"/>
-            </a:effectRef>
-            <a:fontRef idx="minor">
-              <a:schemeClr val="dk1"/>
-            </a:fontRef>
-          </p:style>
-          <p:txBody>
-            <a:bodyPr rot="0" spcFirstLastPara="0" vertOverflow="overflow" horzOverflow="overflow" vert="horz" wrap="square" lIns="91440" tIns="45720" rIns="91440" bIns="45720" numCol="1" spcCol="0" rtlCol="0" fromWordArt="0" anchor="ctr" anchorCtr="0" forceAA="0" compatLnSpc="1">
-              <a:prstTxWarp prst="textNoShape">
-                <a:avLst/>
-              </a:prstTxWarp>
-              <a:noAutofit/>
-            </a:bodyPr>
-            <a:lstStyle/>
-            <a:p>
-              <a:pPr algn="ctr"/>
-              <a:r>
-                <a:rPr lang="en-US" sz="2000" dirty="0" smtClean="0">
-                  <a:solidFill>
-                    <a:schemeClr val="tx1"/>
-                  </a:solidFill>
-                </a:rPr>
-                <a:t>Question: Why is this not a very good example?</a:t>
-              </a:r>
-            </a:p>
-          </p:txBody>
-        </p:sp>
-        <p:cxnSp>
-          <p:nvCxnSpPr>
-            <p:cNvPr id="6" name="Elbow Connector 5"/>
-            <p:cNvCxnSpPr>
-              <a:stCxn id="4" idx="1"/>
-            </p:cNvCxnSpPr>
-            <p:nvPr/>
-          </p:nvCxnSpPr>
-          <p:spPr>
-            <a:xfrm rot="10800000" flipH="1">
-              <a:off x="609600" y="5486400"/>
-              <a:ext cx="114298" cy="914400"/>
-            </a:xfrm>
-            <a:prstGeom prst="bentConnector4">
-              <a:avLst>
-                <a:gd name="adj1" fmla="val -200003"/>
-                <a:gd name="adj2" fmla="val 100000"/>
-              </a:avLst>
-            </a:prstGeom>
-            <a:ln w="12700">
+            </a:prstTxWarp>
+            <a:noAutofit/>
+          </a:bodyPr>
+          <a:lstStyle/>
+          <a:p>
+            <a:pPr algn="ctr"/>
+            <a:r>
+              <a:rPr lang="en-US" sz="2000" dirty="0" smtClean="0">
+                <a:solidFill>
+                  <a:schemeClr val="tx1"/>
+                </a:solidFill>
+              </a:rPr>
+              <a:t>Why </a:t>
+            </a:r>
+            <a:r>
+              <a:rPr lang="en-US" sz="2000" dirty="0" smtClean="0">
+                <a:solidFill>
+                  <a:schemeClr val="tx1"/>
+                </a:solidFill>
+              </a:rPr>
+              <a:t>is this not a </a:t>
+            </a:r>
+            <a:r>
+              <a:rPr lang="en-US" sz="2000" dirty="0" smtClean="0">
+                <a:solidFill>
+                  <a:schemeClr val="tx1"/>
+                </a:solidFill>
+              </a:rPr>
+              <a:t>good set of examples?</a:t>
+            </a:r>
+            <a:endParaRPr lang="en-US" sz="2000" dirty="0" smtClean="0">
               <a:solidFill>
                 <a:schemeClr val="tx1"/>
               </a:solidFill>
-              <a:tailEnd type="arrow"/>
-            </a:ln>
-          </p:spPr>
-          <p:style>
-            <a:lnRef idx="1">
-              <a:schemeClr val="accent1"/>
-            </a:lnRef>
-            <a:fillRef idx="0">
-              <a:schemeClr val="accent1"/>
-            </a:fillRef>
-            <a:effectRef idx="0">
-              <a:schemeClr val="accent1"/>
-            </a:effectRef>
-            <a:fontRef idx="minor">
-              <a:schemeClr val="tx1"/>
-            </a:fontRef>
-          </p:style>
-        </p:cxnSp>
-      </p:grpSp>
+            </a:endParaRPr>
+          </a:p>
+        </p:txBody>
+      </p:sp>
       <p:sp>
         <p:nvSpPr>
           <p:cNvPr id="21" name="Rectangle 20"/>
@@ -14983,8 +14952,13 @@
                   <a:schemeClr val="tx1"/>
                 </a:solidFill>
               </a:rPr>
-              <a:t>Answer: it only shows what happens when the first even is the first element of the list.</a:t>
-            </a:r>
+              <a:t>Answer: None of them show what happens when the first element of the list is odd</a:t>
+            </a:r>
+            <a:endParaRPr lang="en-US" sz="2000" dirty="0" smtClean="0">
+              <a:solidFill>
+                <a:schemeClr val="tx1"/>
+              </a:solidFill>
+            </a:endParaRPr>
           </a:p>
         </p:txBody>
       </p:sp>
@@ -15019,7 +14993,7 @@
                             </p:stCondLst>
                             <p:childTnLst>
                               <p:par>
-                                <p:cTn id="5" presetID="1" presetClass="entr" presetSubtype="0" fill="hold" nodeType="clickEffect">
+                                <p:cTn id="5" presetID="22" presetClass="entr" presetSubtype="1" fill="hold" grpId="0" nodeType="clickEffect">
                                   <p:stCondLst>
                                     <p:cond delay="0"/>
                                   </p:stCondLst>
@@ -15027,51 +15001,6 @@
                                     <p:set>
                                       <p:cBhvr>
                                         <p:cTn id="6" dur="1" fill="hold">
-                                          <p:stCondLst>
-                                            <p:cond delay="0"/>
-                                          </p:stCondLst>
-                                        </p:cTn>
-                                        <p:tgtEl>
-                                          <p:spTgt spid="19"/>
-                                        </p:tgtEl>
-                                        <p:attrNameLst>
-                                          <p:attrName>style.visibility</p:attrName>
-                                        </p:attrNameLst>
-                                      </p:cBhvr>
-                                      <p:to>
-                                        <p:strVal val="visible"/>
-                                      </p:to>
-                                    </p:set>
-                                  </p:childTnLst>
-                                </p:cTn>
-                              </p:par>
-                            </p:childTnLst>
-                          </p:cTn>
-                        </p:par>
-                      </p:childTnLst>
-                    </p:cTn>
-                  </p:par>
-                  <p:par>
-                    <p:cTn id="7" fill="hold">
-                      <p:stCondLst>
-                        <p:cond delay="indefinite"/>
-                      </p:stCondLst>
-                      <p:childTnLst>
-                        <p:par>
-                          <p:cTn id="8" fill="hold">
-                            <p:stCondLst>
-                              <p:cond delay="0"/>
-                            </p:stCondLst>
-                            <p:childTnLst>
-                              <p:par>
-                                <p:cTn id="9" presetID="22" presetClass="entr" presetSubtype="1" fill="hold" grpId="0" nodeType="clickEffect">
-                                  <p:stCondLst>
-                                    <p:cond delay="0"/>
-                                  </p:stCondLst>
-                                  <p:childTnLst>
-                                    <p:set>
-                                      <p:cBhvr>
-                                        <p:cTn id="10" dur="1" fill="hold">
                                           <p:stCondLst>
                                             <p:cond delay="0"/>
                                           </p:stCondLst>
@@ -15089,7 +15018,7 @@
                                     </p:set>
                                     <p:animEffect transition="in" filter="wipe(up)">
                                       <p:cBhvr>
-                                        <p:cTn id="11" dur="500"/>
+                                        <p:cTn id="7" dur="500"/>
                                         <p:tgtEl>
                                           <p:spTgt spid="21"/>
                                         </p:tgtEl>
@@ -17113,11 +17042,7 @@
           <a:p>
             <a:r>
               <a:rPr lang="en-US" smtClean="0"/>
-              <a:t>Do </a:t>
-            </a:r>
-            <a:r>
-              <a:rPr lang="en-US" smtClean="0"/>
-              <a:t>Guided Practice 4.3</a:t>
+              <a:t>Do Guided Practice 4.3</a:t>
             </a:r>
             <a:endParaRPr lang="en-US" dirty="0" smtClean="0"/>
           </a:p>
@@ -17959,7 +17884,15 @@
             </a:r>
             <a:r>
               <a:rPr lang="en-US" dirty="0" smtClean="0"/>
-              <a:t> are called, so their invariants are satisfied.</a:t>
+              <a:t> are called, so their </a:t>
+            </a:r>
+            <a:r>
+              <a:rPr lang="en-US" dirty="0" smtClean="0"/>
+              <a:t>WHERE-clauses are </a:t>
+            </a:r>
+            <a:r>
+              <a:rPr lang="en-US" dirty="0" smtClean="0"/>
+              <a:t>satisfied.</a:t>
             </a:r>
             <a:endParaRPr lang="en-US" dirty="0"/>
           </a:p>

</xml_diff>